<commit_message>
Class 2, update end
</commit_message>
<xml_diff>
--- a/presentations/class-2/Class 2.2_ Flow Control, Loops, Arrays.pptx
+++ b/presentations/class-2/Class 2.2_ Flow Control, Loops, Arrays.pptx
@@ -2162,8 +2162,8 @@
         </p:nvSpPr>
         <p:spPr>
           <a:xfrm>
-            <a:off x="381187" y="685800"/>
-            <a:ext cx="6096299" cy="3429000"/>
+            <a:off x="381000" y="685800"/>
+            <a:ext cx="6096000" cy="3429000"/>
           </a:xfrm>
           <a:custGeom>
             <a:avLst/>
@@ -12325,7 +12325,7 @@
               <a:buAutoNum type="arabicParenR"/>
             </a:pPr>
             <a:r>
-              <a:rPr lang="en" sz="1800" b="0" i="0" u="none" strike="noStrike" cap="none" baseline="0">
+              <a:rPr lang="en" sz="1800" b="0" i="0" u="none" strike="noStrike" cap="none" baseline="0" dirty="0">
                 <a:solidFill>
                   <a:schemeClr val="dk1"/>
                 </a:solidFill>
@@ -12335,29 +12335,10 @@
                 <a:sym typeface="Calibri"/>
                 <a:rtl val="0"/>
               </a:rPr>
-              <a:t>Set a variable to a string containing your name</a:t>
-            </a:r>
-          </a:p>
-          <a:p>
-            <a:pPr marL="457200" marR="0" lvl="0" indent="-342900" algn="l" rtl="0">
-              <a:lnSpc>
-                <a:spcPct val="100000"/>
-              </a:lnSpc>
-              <a:spcBef>
-                <a:spcPts val="0"/>
-              </a:spcBef>
-              <a:spcAft>
-                <a:spcPts val="0"/>
-              </a:spcAft>
-              <a:buClr>
-                <a:schemeClr val="dk1"/>
-              </a:buClr>
-              <a:buSzPct val="100000"/>
-              <a:buFont typeface="Calibri"/>
-              <a:buAutoNum type="arabicParenR"/>
-            </a:pPr>
-            <a:r>
-              <a:rPr lang="en" sz="1800" b="0" i="0" u="none" strike="noStrike" cap="none" baseline="0">
+              <a:t>Set a variable to a string containing your </a:t>
+            </a:r>
+            <a:r>
+              <a:rPr lang="en-US" sz="1800" b="0" i="0" u="none" strike="noStrike" cap="none" baseline="0" dirty="0" smtClean="0">
                 <a:solidFill>
                   <a:schemeClr val="dk1"/>
                 </a:solidFill>
@@ -12367,29 +12348,10 @@
                 <a:sym typeface="Calibri"/>
                 <a:rtl val="0"/>
               </a:rPr>
-              <a:t>Set a variable to the state you live in</a:t>
-            </a:r>
-          </a:p>
-          <a:p>
-            <a:pPr marL="457200" marR="0" lvl="0" indent="-342900" algn="l" rtl="0">
-              <a:lnSpc>
-                <a:spcPct val="100000"/>
-              </a:lnSpc>
-              <a:spcBef>
-                <a:spcPts val="0"/>
-              </a:spcBef>
-              <a:spcAft>
-                <a:spcPts val="0"/>
-              </a:spcAft>
-              <a:buClr>
-                <a:schemeClr val="dk1"/>
-              </a:buClr>
-              <a:buSzPct val="100000"/>
-              <a:buFont typeface="Calibri"/>
-              <a:buAutoNum type="arabicParenR"/>
-            </a:pPr>
-            <a:r>
-              <a:rPr lang="en" sz="1800" b="0" i="0" u="none" strike="noStrike" cap="none" baseline="0">
+              <a:t>full </a:t>
+            </a:r>
+            <a:r>
+              <a:rPr lang="en" sz="1800" b="0" i="0" u="none" strike="noStrike" cap="none" baseline="0" dirty="0" smtClean="0">
                 <a:solidFill>
                   <a:schemeClr val="dk1"/>
                 </a:solidFill>
@@ -12399,11 +12361,21 @@
                 <a:sym typeface="Calibri"/>
                 <a:rtl val="0"/>
               </a:rPr>
-              <a:t>Write two functions. </a:t>
-            </a:r>
-          </a:p>
-          <a:p>
-            <a:pPr marL="914400" marR="0" lvl="1" indent="-342900" algn="l" rtl="0">
+              <a:t>name</a:t>
+            </a:r>
+            <a:endParaRPr lang="en" sz="1800" b="0" i="0" u="none" strike="noStrike" cap="none" baseline="0" dirty="0">
+              <a:solidFill>
+                <a:schemeClr val="dk1"/>
+              </a:solidFill>
+              <a:latin typeface="Calibri"/>
+              <a:ea typeface="Calibri"/>
+              <a:cs typeface="Calibri"/>
+              <a:sym typeface="Calibri"/>
+              <a:rtl val="0"/>
+            </a:endParaRPr>
+          </a:p>
+          <a:p>
+            <a:pPr marL="457200" marR="0" lvl="0" indent="-342900" algn="l" rtl="0">
               <a:lnSpc>
                 <a:spcPct val="100000"/>
               </a:lnSpc>
@@ -12418,10 +12390,10 @@
               </a:buClr>
               <a:buSzPct val="100000"/>
               <a:buFont typeface="Calibri"/>
-              <a:buAutoNum type="alphaLcParenR"/>
-            </a:pPr>
-            <a:r>
-              <a:rPr lang="en" sz="1800" b="0" i="0" u="none" strike="noStrike" cap="none" baseline="0">
+              <a:buAutoNum type="arabicParenR"/>
+            </a:pPr>
+            <a:r>
+              <a:rPr lang="en" sz="1800" b="0" i="0" u="none" strike="noStrike" cap="none" baseline="0" dirty="0">
                 <a:solidFill>
                   <a:schemeClr val="dk1"/>
                 </a:solidFill>
@@ -12431,11 +12403,11 @@
                 <a:sym typeface="Calibri"/>
                 <a:rtl val="0"/>
               </a:rPr>
-              <a:t>Result 1: “FirstName LastName is a student at UArts.”</a:t>
-            </a:r>
-          </a:p>
-          <a:p>
-            <a:pPr marL="914400" marR="0" lvl="1" indent="-342900" algn="l" rtl="0">
+              <a:t>Set a variable to the state you live in</a:t>
+            </a:r>
+          </a:p>
+          <a:p>
+            <a:pPr marL="457200" marR="0" lvl="0" indent="-342900" algn="l" rtl="0">
               <a:lnSpc>
                 <a:spcPct val="100000"/>
               </a:lnSpc>
@@ -12450,10 +12422,10 @@
               </a:buClr>
               <a:buSzPct val="100000"/>
               <a:buFont typeface="Calibri"/>
-              <a:buAutoNum type="alphaLcParenR"/>
-            </a:pPr>
-            <a:r>
-              <a:rPr lang="en" sz="1800" b="0" i="0" u="none" strike="noStrike" cap="none" baseline="0">
+              <a:buAutoNum type="arabicParenR"/>
+            </a:pPr>
+            <a:r>
+              <a:rPr lang="en" sz="1800" b="0" i="0" u="none" strike="noStrike" cap="none" baseline="0" dirty="0">
                 <a:solidFill>
                   <a:schemeClr val="dk1"/>
                 </a:solidFill>
@@ -12463,11 +12435,11 @@
                 <a:sym typeface="Calibri"/>
                 <a:rtl val="0"/>
               </a:rPr>
-              <a:t>Result 2: “FirstName LastName lives in the state of Pennsylvania”</a:t>
-            </a:r>
-          </a:p>
-          <a:p>
-            <a:pPr marL="457200" marR="0" lvl="0" indent="-342900" algn="l" rtl="0">
+              <a:t>Write two functions. </a:t>
+            </a:r>
+          </a:p>
+          <a:p>
+            <a:pPr marL="914400" marR="0" lvl="1" indent="-342900" algn="l" rtl="0">
               <a:lnSpc>
                 <a:spcPct val="100000"/>
               </a:lnSpc>
@@ -12482,10 +12454,10 @@
               </a:buClr>
               <a:buSzPct val="100000"/>
               <a:buFont typeface="Calibri"/>
-              <a:buAutoNum type="arabicPeriod" startAt="4"/>
-            </a:pPr>
-            <a:r>
-              <a:rPr lang="en" sz="1800" b="0" i="0" u="none" strike="noStrike" cap="none" baseline="0">
+              <a:buAutoNum type="alphaLcParenR"/>
+            </a:pPr>
+            <a:r>
+              <a:rPr lang="en-US" sz="1800" dirty="0" smtClean="0">
                 <a:solidFill>
                   <a:schemeClr val="dk1"/>
                 </a:solidFill>
@@ -12493,31 +12465,11 @@
                 <a:ea typeface="Calibri"/>
                 <a:cs typeface="Calibri"/>
                 <a:sym typeface="Calibri"/>
-                <a:rtl val="0"/>
-              </a:rPr>
-              <a:t>Write a third function that calls the first and second and concatenates the return values of function 1 and 2.</a:t>
-            </a:r>
-          </a:p>
-          <a:p>
-            <a:pPr marL="457200" marR="0" lvl="0" indent="-342900" algn="l" rtl="0">
-              <a:lnSpc>
-                <a:spcPct val="100000"/>
-              </a:lnSpc>
-              <a:spcBef>
-                <a:spcPts val="0"/>
-              </a:spcBef>
-              <a:spcAft>
-                <a:spcPts val="0"/>
-              </a:spcAft>
-              <a:buClr>
-                <a:schemeClr val="dk1"/>
-              </a:buClr>
-              <a:buSzPct val="100000"/>
-              <a:buFont typeface="Calibri"/>
-              <a:buAutoNum type="arabicPeriod" startAt="4"/>
-            </a:pPr>
-            <a:r>
-              <a:rPr lang="en" sz="1800" b="0" i="0" u="none" strike="noStrike" cap="none" baseline="0">
+              </a:rPr>
+              <a:t>Function</a:t>
+            </a:r>
+            <a:r>
+              <a:rPr lang="en" sz="1800" b="0" i="0" u="none" strike="noStrike" cap="none" baseline="0" dirty="0" smtClean="0">
                 <a:solidFill>
                   <a:schemeClr val="dk1"/>
                 </a:solidFill>
@@ -12527,8 +12479,428 @@
                 <a:sym typeface="Calibri"/>
                 <a:rtl val="0"/>
               </a:rPr>
-              <a:t>Call function three, pass it 3 arguments, which are passed to function 1 and 2.</a:t>
-            </a:r>
+              <a:t> 1</a:t>
+            </a:r>
+            <a:r>
+              <a:rPr lang="en-US" sz="1800" b="0" i="0" u="none" strike="noStrike" cap="none" baseline="0" dirty="0" smtClean="0">
+                <a:solidFill>
+                  <a:schemeClr val="dk1"/>
+                </a:solidFill>
+                <a:latin typeface="Calibri"/>
+                <a:ea typeface="Calibri"/>
+                <a:cs typeface="Calibri"/>
+                <a:sym typeface="Calibri"/>
+                <a:rtl val="0"/>
+              </a:rPr>
+              <a:t> return value</a:t>
+            </a:r>
+            <a:r>
+              <a:rPr lang="en" sz="1800" b="0" i="0" u="none" strike="noStrike" cap="none" baseline="0" dirty="0" smtClean="0">
+                <a:solidFill>
+                  <a:schemeClr val="dk1"/>
+                </a:solidFill>
+                <a:latin typeface="Calibri"/>
+                <a:ea typeface="Calibri"/>
+                <a:cs typeface="Calibri"/>
+                <a:sym typeface="Calibri"/>
+                <a:rtl val="0"/>
+              </a:rPr>
+              <a:t>: </a:t>
+            </a:r>
+            <a:r>
+              <a:rPr lang="en" sz="1800" b="0" i="0" u="none" strike="noStrike" cap="none" baseline="0" dirty="0">
+                <a:solidFill>
+                  <a:schemeClr val="dk1"/>
+                </a:solidFill>
+                <a:latin typeface="Calibri"/>
+                <a:ea typeface="Calibri"/>
+                <a:cs typeface="Calibri"/>
+                <a:sym typeface="Calibri"/>
+                <a:rtl val="0"/>
+              </a:rPr>
+              <a:t>“FirstName LastName is a student at UArts.”</a:t>
+            </a:r>
+          </a:p>
+          <a:p>
+            <a:pPr marL="914400" marR="0" lvl="1" indent="-342900" algn="l" rtl="0">
+              <a:lnSpc>
+                <a:spcPct val="100000"/>
+              </a:lnSpc>
+              <a:spcBef>
+                <a:spcPts val="0"/>
+              </a:spcBef>
+              <a:spcAft>
+                <a:spcPts val="0"/>
+              </a:spcAft>
+              <a:buClr>
+                <a:schemeClr val="dk1"/>
+              </a:buClr>
+              <a:buSzPct val="100000"/>
+              <a:buFont typeface="Calibri"/>
+              <a:buAutoNum type="alphaLcParenR"/>
+            </a:pPr>
+            <a:r>
+              <a:rPr lang="en-US" sz="1800" b="0" i="0" u="none" strike="noStrike" cap="none" baseline="0" dirty="0" smtClean="0">
+                <a:solidFill>
+                  <a:schemeClr val="dk1"/>
+                </a:solidFill>
+                <a:latin typeface="Calibri"/>
+                <a:ea typeface="Calibri"/>
+                <a:cs typeface="Calibri"/>
+                <a:sym typeface="Calibri"/>
+                <a:rtl val="0"/>
+              </a:rPr>
+              <a:t>Function</a:t>
+            </a:r>
+            <a:r>
+              <a:rPr lang="en" sz="1800" b="0" i="0" u="none" strike="noStrike" cap="none" baseline="0" dirty="0" smtClean="0">
+                <a:solidFill>
+                  <a:schemeClr val="dk1"/>
+                </a:solidFill>
+                <a:latin typeface="Calibri"/>
+                <a:ea typeface="Calibri"/>
+                <a:cs typeface="Calibri"/>
+                <a:sym typeface="Calibri"/>
+                <a:rtl val="0"/>
+              </a:rPr>
+              <a:t> 2</a:t>
+            </a:r>
+            <a:r>
+              <a:rPr lang="en-US" sz="1800" b="0" i="0" u="none" strike="noStrike" cap="none" baseline="0" dirty="0" smtClean="0">
+                <a:solidFill>
+                  <a:schemeClr val="dk1"/>
+                </a:solidFill>
+                <a:latin typeface="Calibri"/>
+                <a:ea typeface="Calibri"/>
+                <a:cs typeface="Calibri"/>
+                <a:sym typeface="Calibri"/>
+                <a:rtl val="0"/>
+              </a:rPr>
+              <a:t> return value</a:t>
+            </a:r>
+            <a:r>
+              <a:rPr lang="en" sz="1800" b="0" i="0" u="none" strike="noStrike" cap="none" baseline="0" dirty="0" smtClean="0">
+                <a:solidFill>
+                  <a:schemeClr val="dk1"/>
+                </a:solidFill>
+                <a:latin typeface="Calibri"/>
+                <a:ea typeface="Calibri"/>
+                <a:cs typeface="Calibri"/>
+                <a:sym typeface="Calibri"/>
+                <a:rtl val="0"/>
+              </a:rPr>
+              <a:t>: </a:t>
+            </a:r>
+            <a:r>
+              <a:rPr lang="en" sz="1800" b="0" i="0" u="none" strike="noStrike" cap="none" baseline="0" dirty="0">
+                <a:solidFill>
+                  <a:schemeClr val="dk1"/>
+                </a:solidFill>
+                <a:latin typeface="Calibri"/>
+                <a:ea typeface="Calibri"/>
+                <a:cs typeface="Calibri"/>
+                <a:sym typeface="Calibri"/>
+                <a:rtl val="0"/>
+              </a:rPr>
+              <a:t>“FirstName LastName lives in the state of Pennsylvania”</a:t>
+            </a:r>
+          </a:p>
+          <a:p>
+            <a:pPr marL="457200" marR="0" lvl="0" indent="-342900" algn="l" rtl="0">
+              <a:lnSpc>
+                <a:spcPct val="100000"/>
+              </a:lnSpc>
+              <a:spcBef>
+                <a:spcPts val="0"/>
+              </a:spcBef>
+              <a:spcAft>
+                <a:spcPts val="0"/>
+              </a:spcAft>
+              <a:buClr>
+                <a:schemeClr val="dk1"/>
+              </a:buClr>
+              <a:buSzPct val="100000"/>
+              <a:buFont typeface="Calibri"/>
+              <a:buAutoNum type="arabicPeriod" startAt="4"/>
+            </a:pPr>
+            <a:r>
+              <a:rPr lang="en" sz="1800" b="0" i="0" u="none" strike="noStrike" cap="none" baseline="0" dirty="0">
+                <a:solidFill>
+                  <a:schemeClr val="dk1"/>
+                </a:solidFill>
+                <a:latin typeface="Calibri"/>
+                <a:ea typeface="Calibri"/>
+                <a:cs typeface="Calibri"/>
+                <a:sym typeface="Calibri"/>
+                <a:rtl val="0"/>
+              </a:rPr>
+              <a:t>Write a third function that calls the first and second and concatenates the return values of function 1 and 2.</a:t>
+            </a:r>
+          </a:p>
+          <a:p>
+            <a:pPr marL="457200" marR="0" lvl="0" indent="-342900" algn="l" rtl="0">
+              <a:lnSpc>
+                <a:spcPct val="100000"/>
+              </a:lnSpc>
+              <a:spcBef>
+                <a:spcPts val="0"/>
+              </a:spcBef>
+              <a:spcAft>
+                <a:spcPts val="0"/>
+              </a:spcAft>
+              <a:buClr>
+                <a:schemeClr val="dk1"/>
+              </a:buClr>
+              <a:buSzPct val="100000"/>
+              <a:buFont typeface="Calibri"/>
+              <a:buAutoNum type="arabicPeriod" startAt="4"/>
+            </a:pPr>
+            <a:r>
+              <a:rPr lang="en-US" sz="1800" b="0" i="0" u="none" strike="noStrike" cap="none" baseline="0" dirty="0" smtClean="0">
+                <a:solidFill>
+                  <a:schemeClr val="dk1"/>
+                </a:solidFill>
+                <a:latin typeface="Calibri"/>
+                <a:ea typeface="Calibri"/>
+                <a:cs typeface="Calibri"/>
+                <a:sym typeface="Calibri"/>
+                <a:rtl val="0"/>
+              </a:rPr>
+              <a:t>Execute by </a:t>
+            </a:r>
+            <a:r>
+              <a:rPr lang="en-US" sz="1800" dirty="0" smtClean="0">
+                <a:solidFill>
+                  <a:schemeClr val="dk1"/>
+                </a:solidFill>
+                <a:latin typeface="Calibri"/>
+                <a:ea typeface="Calibri"/>
+                <a:cs typeface="Calibri"/>
+                <a:sym typeface="Calibri"/>
+              </a:rPr>
+              <a:t>c</a:t>
+            </a:r>
+            <a:r>
+              <a:rPr lang="en" sz="1800" b="0" i="0" u="none" strike="noStrike" cap="none" baseline="0" dirty="0" smtClean="0">
+                <a:solidFill>
+                  <a:schemeClr val="dk1"/>
+                </a:solidFill>
+                <a:latin typeface="Calibri"/>
+                <a:ea typeface="Calibri"/>
+                <a:cs typeface="Calibri"/>
+                <a:sym typeface="Calibri"/>
+                <a:rtl val="0"/>
+              </a:rPr>
+              <a:t>all</a:t>
+            </a:r>
+            <a:r>
+              <a:rPr lang="en-US" sz="1800" b="0" i="0" u="none" strike="noStrike" cap="none" baseline="0" dirty="0" err="1" smtClean="0">
+                <a:solidFill>
+                  <a:schemeClr val="dk1"/>
+                </a:solidFill>
+                <a:latin typeface="Calibri"/>
+                <a:ea typeface="Calibri"/>
+                <a:cs typeface="Calibri"/>
+                <a:sym typeface="Calibri"/>
+                <a:rtl val="0"/>
+              </a:rPr>
+              <a:t>ing</a:t>
+            </a:r>
+            <a:r>
+              <a:rPr lang="en" sz="1800" b="0" i="0" u="none" strike="noStrike" cap="none" baseline="0" dirty="0" smtClean="0">
+                <a:solidFill>
+                  <a:schemeClr val="dk1"/>
+                </a:solidFill>
+                <a:latin typeface="Calibri"/>
+                <a:ea typeface="Calibri"/>
+                <a:cs typeface="Calibri"/>
+                <a:sym typeface="Calibri"/>
+                <a:rtl val="0"/>
+              </a:rPr>
+              <a:t> </a:t>
+            </a:r>
+            <a:r>
+              <a:rPr lang="en" sz="1800" b="0" i="0" u="none" strike="noStrike" cap="none" baseline="0" dirty="0">
+                <a:solidFill>
+                  <a:schemeClr val="dk1"/>
+                </a:solidFill>
+                <a:latin typeface="Calibri"/>
+                <a:ea typeface="Calibri"/>
+                <a:cs typeface="Calibri"/>
+                <a:sym typeface="Calibri"/>
+                <a:rtl val="0"/>
+              </a:rPr>
+              <a:t>function three, pass it 3 </a:t>
+            </a:r>
+            <a:r>
+              <a:rPr lang="en" sz="1800" b="0" i="0" u="none" strike="noStrike" cap="none" baseline="0" dirty="0" smtClean="0">
+                <a:solidFill>
+                  <a:schemeClr val="dk1"/>
+                </a:solidFill>
+                <a:latin typeface="Calibri"/>
+                <a:ea typeface="Calibri"/>
+                <a:cs typeface="Calibri"/>
+                <a:sym typeface="Calibri"/>
+                <a:rtl val="0"/>
+              </a:rPr>
+              <a:t>arguments</a:t>
+            </a:r>
+            <a:r>
+              <a:rPr lang="en-US" sz="1800" b="0" i="0" u="none" strike="noStrike" cap="none" baseline="0" dirty="0" smtClean="0">
+                <a:solidFill>
+                  <a:schemeClr val="dk1"/>
+                </a:solidFill>
+                <a:latin typeface="Calibri"/>
+                <a:ea typeface="Calibri"/>
+                <a:cs typeface="Calibri"/>
+                <a:sym typeface="Calibri"/>
+                <a:rtl val="0"/>
+              </a:rPr>
+              <a:t> (first name,</a:t>
+            </a:r>
+            <a:r>
+              <a:rPr lang="en-US" sz="1800" b="0" i="0" u="none" strike="noStrike" cap="none" dirty="0" smtClean="0">
+                <a:solidFill>
+                  <a:schemeClr val="dk1"/>
+                </a:solidFill>
+                <a:latin typeface="Calibri"/>
+                <a:ea typeface="Calibri"/>
+                <a:cs typeface="Calibri"/>
+                <a:sym typeface="Calibri"/>
+                <a:rtl val="0"/>
+              </a:rPr>
+              <a:t> last name, state)</a:t>
+            </a:r>
+            <a:r>
+              <a:rPr lang="en" sz="1800" b="0" i="0" u="none" strike="noStrike" cap="none" baseline="0" dirty="0" smtClean="0">
+                <a:solidFill>
+                  <a:schemeClr val="dk1"/>
+                </a:solidFill>
+                <a:latin typeface="Calibri"/>
+                <a:ea typeface="Calibri"/>
+                <a:cs typeface="Calibri"/>
+                <a:sym typeface="Calibri"/>
+                <a:rtl val="0"/>
+              </a:rPr>
+              <a:t>, </a:t>
+            </a:r>
+            <a:r>
+              <a:rPr lang="en" sz="1800" b="0" i="0" u="none" strike="noStrike" cap="none" baseline="0" dirty="0">
+                <a:solidFill>
+                  <a:schemeClr val="dk1"/>
+                </a:solidFill>
+                <a:latin typeface="Calibri"/>
+                <a:ea typeface="Calibri"/>
+                <a:cs typeface="Calibri"/>
+                <a:sym typeface="Calibri"/>
+                <a:rtl val="0"/>
+              </a:rPr>
+              <a:t>which are passed to function 1 and 2</a:t>
+            </a:r>
+            <a:r>
+              <a:rPr lang="en" sz="1800" b="0" i="0" u="none" strike="noStrike" cap="none" baseline="0" dirty="0" smtClean="0">
+                <a:solidFill>
+                  <a:schemeClr val="dk1"/>
+                </a:solidFill>
+                <a:latin typeface="Calibri"/>
+                <a:ea typeface="Calibri"/>
+                <a:cs typeface="Calibri"/>
+                <a:sym typeface="Calibri"/>
+                <a:rtl val="0"/>
+              </a:rPr>
+              <a:t>.</a:t>
+            </a:r>
+            <a:endParaRPr lang="en-US" sz="1800" b="0" i="0" u="none" strike="noStrike" cap="none" baseline="0" dirty="0" smtClean="0">
+              <a:solidFill>
+                <a:schemeClr val="dk1"/>
+              </a:solidFill>
+              <a:latin typeface="Calibri"/>
+              <a:ea typeface="Calibri"/>
+              <a:cs typeface="Calibri"/>
+              <a:sym typeface="Calibri"/>
+              <a:rtl val="0"/>
+            </a:endParaRPr>
+          </a:p>
+          <a:p>
+            <a:pPr marL="457200" marR="0" lvl="0" indent="-342900" algn="l" rtl="0">
+              <a:lnSpc>
+                <a:spcPct val="100000"/>
+              </a:lnSpc>
+              <a:spcBef>
+                <a:spcPts val="0"/>
+              </a:spcBef>
+              <a:spcAft>
+                <a:spcPts val="0"/>
+              </a:spcAft>
+              <a:buClr>
+                <a:schemeClr val="dk1"/>
+              </a:buClr>
+              <a:buSzPct val="100000"/>
+              <a:buFont typeface="Calibri"/>
+              <a:buAutoNum type="arabicPeriod" startAt="4"/>
+            </a:pPr>
+            <a:r>
+              <a:rPr lang="en-US" sz="1800" b="0" i="0" u="none" strike="noStrike" cap="none" baseline="0" dirty="0" smtClean="0">
+                <a:solidFill>
+                  <a:schemeClr val="dk1"/>
+                </a:solidFill>
+                <a:latin typeface="Calibri"/>
+                <a:ea typeface="Calibri"/>
+                <a:cs typeface="Calibri"/>
+                <a:sym typeface="Calibri"/>
+                <a:rtl val="0"/>
+              </a:rPr>
+              <a:t>Using </a:t>
+            </a:r>
+            <a:r>
+              <a:rPr lang="en-US" sz="1800" b="0" i="0" u="none" strike="noStrike" cap="none" baseline="0" dirty="0" err="1" smtClean="0">
+                <a:solidFill>
+                  <a:schemeClr val="dk1"/>
+                </a:solidFill>
+                <a:latin typeface="Calibri"/>
+                <a:ea typeface="Calibri"/>
+                <a:cs typeface="Calibri"/>
+                <a:sym typeface="Calibri"/>
+                <a:rtl val="0"/>
+              </a:rPr>
+              <a:t>JQuery</a:t>
+            </a:r>
+            <a:r>
+              <a:rPr lang="en-US" sz="1800" b="0" i="0" u="none" strike="noStrike" cap="none" baseline="0" dirty="0" smtClean="0">
+                <a:solidFill>
+                  <a:schemeClr val="dk1"/>
+                </a:solidFill>
+                <a:latin typeface="Calibri"/>
+                <a:ea typeface="Calibri"/>
+                <a:cs typeface="Calibri"/>
+                <a:sym typeface="Calibri"/>
+                <a:rtl val="0"/>
+              </a:rPr>
+              <a:t>, write the string to three</a:t>
+            </a:r>
+            <a:r>
+              <a:rPr lang="en-US" sz="1800" b="0" i="0" u="none" strike="noStrike" cap="none" dirty="0" smtClean="0">
+                <a:solidFill>
+                  <a:schemeClr val="dk1"/>
+                </a:solidFill>
+                <a:latin typeface="Calibri"/>
+                <a:ea typeface="Calibri"/>
+                <a:cs typeface="Calibri"/>
+                <a:sym typeface="Calibri"/>
+                <a:rtl val="0"/>
+              </a:rPr>
+              <a:t> places in the DOM, by using a class selector, an ID selector, and an HTML tag selector.</a:t>
+            </a:r>
+            <a:endParaRPr lang="en" sz="1800" b="0" i="0" u="none" strike="noStrike" cap="none" baseline="0" dirty="0">
+              <a:solidFill>
+                <a:schemeClr val="dk1"/>
+              </a:solidFill>
+              <a:latin typeface="Calibri"/>
+              <a:ea typeface="Calibri"/>
+              <a:cs typeface="Calibri"/>
+              <a:sym typeface="Calibri"/>
+              <a:rtl val="0"/>
+            </a:endParaRPr>
           </a:p>
         </p:txBody>
       </p:sp>

</xml_diff>